<commit_message>
updated loop for extinctions
updated loop for extinctions

need to add documentaion next time
</commit_message>
<xml_diff>
--- a/Presentations/Results extinctions.pptx
+++ b/Presentations/Results extinctions.pptx
@@ -25,6 +25,19 @@
     <p:sldId id="269" r:id="rId19"/>
     <p:sldId id="270" r:id="rId20"/>
     <p:sldId id="278" r:id="rId21"/>
+    <p:sldId id="283" r:id="rId22"/>
+    <p:sldId id="282" r:id="rId23"/>
+    <p:sldId id="284" r:id="rId24"/>
+    <p:sldId id="285" r:id="rId25"/>
+    <p:sldId id="286" r:id="rId26"/>
+    <p:sldId id="287" r:id="rId27"/>
+    <p:sldId id="288" r:id="rId28"/>
+    <p:sldId id="289" r:id="rId29"/>
+    <p:sldId id="292" r:id="rId30"/>
+    <p:sldId id="290" r:id="rId31"/>
+    <p:sldId id="291" r:id="rId32"/>
+    <p:sldId id="293" r:id="rId33"/>
+    <p:sldId id="294" r:id="rId34"/>
   </p:sldIdLst>
   <p:sldSz cx="12192000" cy="6858000"/>
   <p:notesSz cx="6858000" cy="9144000"/>
@@ -280,7 +293,7 @@
           <a:p>
             <a:fld id="{683464CF-AD24-4EE0-91BB-E54D4A15EF9B}" type="datetimeFigureOut">
               <a:rPr lang="sv-FI" smtClean="0"/>
-              <a:t>02-03-2023</a:t>
+              <a:t>26-04-2023</a:t>
             </a:fld>
             <a:endParaRPr lang="sv-FI"/>
           </a:p>
@@ -480,7 +493,7 @@
           <a:p>
             <a:fld id="{683464CF-AD24-4EE0-91BB-E54D4A15EF9B}" type="datetimeFigureOut">
               <a:rPr lang="sv-FI" smtClean="0"/>
-              <a:t>02-03-2023</a:t>
+              <a:t>26-04-2023</a:t>
             </a:fld>
             <a:endParaRPr lang="sv-FI"/>
           </a:p>
@@ -690,7 +703,7 @@
           <a:p>
             <a:fld id="{683464CF-AD24-4EE0-91BB-E54D4A15EF9B}" type="datetimeFigureOut">
               <a:rPr lang="sv-FI" smtClean="0"/>
-              <a:t>02-03-2023</a:t>
+              <a:t>26-04-2023</a:t>
             </a:fld>
             <a:endParaRPr lang="sv-FI"/>
           </a:p>
@@ -890,7 +903,7 @@
           <a:p>
             <a:fld id="{683464CF-AD24-4EE0-91BB-E54D4A15EF9B}" type="datetimeFigureOut">
               <a:rPr lang="sv-FI" smtClean="0"/>
-              <a:t>02-03-2023</a:t>
+              <a:t>26-04-2023</a:t>
             </a:fld>
             <a:endParaRPr lang="sv-FI"/>
           </a:p>
@@ -1166,7 +1179,7 @@
           <a:p>
             <a:fld id="{683464CF-AD24-4EE0-91BB-E54D4A15EF9B}" type="datetimeFigureOut">
               <a:rPr lang="sv-FI" smtClean="0"/>
-              <a:t>02-03-2023</a:t>
+              <a:t>26-04-2023</a:t>
             </a:fld>
             <a:endParaRPr lang="sv-FI"/>
           </a:p>
@@ -1434,7 +1447,7 @@
           <a:p>
             <a:fld id="{683464CF-AD24-4EE0-91BB-E54D4A15EF9B}" type="datetimeFigureOut">
               <a:rPr lang="sv-FI" smtClean="0"/>
-              <a:t>02-03-2023</a:t>
+              <a:t>26-04-2023</a:t>
             </a:fld>
             <a:endParaRPr lang="sv-FI"/>
           </a:p>
@@ -1849,7 +1862,7 @@
           <a:p>
             <a:fld id="{683464CF-AD24-4EE0-91BB-E54D4A15EF9B}" type="datetimeFigureOut">
               <a:rPr lang="sv-FI" smtClean="0"/>
-              <a:t>02-03-2023</a:t>
+              <a:t>26-04-2023</a:t>
             </a:fld>
             <a:endParaRPr lang="sv-FI"/>
           </a:p>
@@ -1991,7 +2004,7 @@
           <a:p>
             <a:fld id="{683464CF-AD24-4EE0-91BB-E54D4A15EF9B}" type="datetimeFigureOut">
               <a:rPr lang="sv-FI" smtClean="0"/>
-              <a:t>02-03-2023</a:t>
+              <a:t>26-04-2023</a:t>
             </a:fld>
             <a:endParaRPr lang="sv-FI"/>
           </a:p>
@@ -2104,7 +2117,7 @@
           <a:p>
             <a:fld id="{683464CF-AD24-4EE0-91BB-E54D4A15EF9B}" type="datetimeFigureOut">
               <a:rPr lang="sv-FI" smtClean="0"/>
-              <a:t>02-03-2023</a:t>
+              <a:t>26-04-2023</a:t>
             </a:fld>
             <a:endParaRPr lang="sv-FI"/>
           </a:p>
@@ -2417,7 +2430,7 @@
           <a:p>
             <a:fld id="{683464CF-AD24-4EE0-91BB-E54D4A15EF9B}" type="datetimeFigureOut">
               <a:rPr lang="sv-FI" smtClean="0"/>
-              <a:t>02-03-2023</a:t>
+              <a:t>26-04-2023</a:t>
             </a:fld>
             <a:endParaRPr lang="sv-FI"/>
           </a:p>
@@ -2706,7 +2719,7 @@
           <a:p>
             <a:fld id="{683464CF-AD24-4EE0-91BB-E54D4A15EF9B}" type="datetimeFigureOut">
               <a:rPr lang="sv-FI" smtClean="0"/>
-              <a:t>02-03-2023</a:t>
+              <a:t>26-04-2023</a:t>
             </a:fld>
             <a:endParaRPr lang="sv-FI"/>
           </a:p>
@@ -2949,7 +2962,7 @@
           <a:p>
             <a:fld id="{683464CF-AD24-4EE0-91BB-E54D4A15EF9B}" type="datetimeFigureOut">
               <a:rPr lang="sv-FI" smtClean="0"/>
-              <a:t>02-03-2023</a:t>
+              <a:t>26-04-2023</a:t>
             </a:fld>
             <a:endParaRPr lang="sv-FI"/>
           </a:p>
@@ -5686,6 +5699,1266 @@
 </p:sld>
 </file>
 
+<file path=ppt/slides/slide21.xml><?xml version="1.0" encoding="utf-8"?>
+<p:sld xmlns:a="http://schemas.openxmlformats.org/drawingml/2006/main" xmlns:r="http://schemas.openxmlformats.org/officeDocument/2006/relationships" xmlns:p="http://schemas.openxmlformats.org/presentationml/2006/main">
+  <p:cSld>
+    <p:spTree>
+      <p:nvGrpSpPr>
+        <p:cNvPr id="1" name=""/>
+        <p:cNvGrpSpPr/>
+        <p:nvPr/>
+      </p:nvGrpSpPr>
+      <p:grpSpPr>
+        <a:xfrm>
+          <a:off x="0" y="0"/>
+          <a:ext cx="0" cy="0"/>
+          <a:chOff x="0" y="0"/>
+          <a:chExt cx="0" cy="0"/>
+        </a:xfrm>
+      </p:grpSpPr>
+      <p:sp>
+        <p:nvSpPr>
+          <p:cNvPr id="2" name="Rubrik 1">
+            <a:extLst>
+              <a:ext uri="{FF2B5EF4-FFF2-40B4-BE49-F238E27FC236}">
+                <a16:creationId xmlns:a16="http://schemas.microsoft.com/office/drawing/2014/main" id="{7A4689F4-E881-88C9-0FF9-9040809350AF}"/>
+              </a:ext>
+            </a:extLst>
+          </p:cNvPr>
+          <p:cNvSpPr>
+            <a:spLocks noGrp="1"/>
+          </p:cNvSpPr>
+          <p:nvPr>
+            <p:ph type="title"/>
+          </p:nvPr>
+        </p:nvSpPr>
+        <p:spPr/>
+        <p:txBody>
+          <a:bodyPr/>
+          <a:lstStyle/>
+          <a:p>
+            <a:endParaRPr lang="sv-FI"/>
+          </a:p>
+        </p:txBody>
+      </p:sp>
+      <p:sp>
+        <p:nvSpPr>
+          <p:cNvPr id="3" name="Platshållare för innehåll 2">
+            <a:extLst>
+              <a:ext uri="{FF2B5EF4-FFF2-40B4-BE49-F238E27FC236}">
+                <a16:creationId xmlns:a16="http://schemas.microsoft.com/office/drawing/2014/main" id="{96EADF53-BEF2-A61A-F597-5E1D53FCA9EE}"/>
+              </a:ext>
+            </a:extLst>
+          </p:cNvPr>
+          <p:cNvSpPr>
+            <a:spLocks noGrp="1"/>
+          </p:cNvSpPr>
+          <p:nvPr>
+            <p:ph idx="1"/>
+          </p:nvPr>
+        </p:nvSpPr>
+        <p:spPr/>
+        <p:txBody>
+          <a:bodyPr/>
+          <a:lstStyle/>
+          <a:p>
+            <a:endParaRPr lang="sv-FI"/>
+          </a:p>
+        </p:txBody>
+      </p:sp>
+      <p:pic>
+        <p:nvPicPr>
+          <p:cNvPr id="4" name="Bildobjekt 3">
+            <a:extLst>
+              <a:ext uri="{FF2B5EF4-FFF2-40B4-BE49-F238E27FC236}">
+                <a16:creationId xmlns:a16="http://schemas.microsoft.com/office/drawing/2014/main" id="{3C6E1A1B-7088-6002-8F06-93306FB2E921}"/>
+              </a:ext>
+            </a:extLst>
+          </p:cNvPr>
+          <p:cNvPicPr>
+            <a:picLocks noChangeAspect="1"/>
+          </p:cNvPicPr>
+          <p:nvPr/>
+        </p:nvPicPr>
+        <p:blipFill>
+          <a:blip r:embed="rId2"/>
+          <a:stretch>
+            <a:fillRect/>
+          </a:stretch>
+        </p:blipFill>
+        <p:spPr>
+          <a:xfrm>
+            <a:off x="2265886" y="365125"/>
+            <a:ext cx="7660227" cy="5675755"/>
+          </a:xfrm>
+          <a:prstGeom prst="rect">
+            <a:avLst/>
+          </a:prstGeom>
+        </p:spPr>
+      </p:pic>
+    </p:spTree>
+    <p:extLst>
+      <p:ext uri="{BB962C8B-B14F-4D97-AF65-F5344CB8AC3E}">
+        <p14:creationId xmlns:p14="http://schemas.microsoft.com/office/powerpoint/2010/main" val="207454434"/>
+      </p:ext>
+    </p:extLst>
+  </p:cSld>
+  <p:clrMapOvr>
+    <a:masterClrMapping/>
+  </p:clrMapOvr>
+</p:sld>
+</file>
+
+<file path=ppt/slides/slide22.xml><?xml version="1.0" encoding="utf-8"?>
+<p:sld xmlns:a="http://schemas.openxmlformats.org/drawingml/2006/main" xmlns:r="http://schemas.openxmlformats.org/officeDocument/2006/relationships" xmlns:p="http://schemas.openxmlformats.org/presentationml/2006/main">
+  <p:cSld>
+    <p:spTree>
+      <p:nvGrpSpPr>
+        <p:cNvPr id="1" name=""/>
+        <p:cNvGrpSpPr/>
+        <p:nvPr/>
+      </p:nvGrpSpPr>
+      <p:grpSpPr>
+        <a:xfrm>
+          <a:off x="0" y="0"/>
+          <a:ext cx="0" cy="0"/>
+          <a:chOff x="0" y="0"/>
+          <a:chExt cx="0" cy="0"/>
+        </a:xfrm>
+      </p:grpSpPr>
+      <p:sp>
+        <p:nvSpPr>
+          <p:cNvPr id="2" name="Rubrik 1">
+            <a:extLst>
+              <a:ext uri="{FF2B5EF4-FFF2-40B4-BE49-F238E27FC236}">
+                <a16:creationId xmlns:a16="http://schemas.microsoft.com/office/drawing/2014/main" id="{4E0E70A2-CFCE-AD31-0A85-DB48B4EFE729}"/>
+              </a:ext>
+            </a:extLst>
+          </p:cNvPr>
+          <p:cNvSpPr>
+            <a:spLocks noGrp="1"/>
+          </p:cNvSpPr>
+          <p:nvPr>
+            <p:ph type="title"/>
+          </p:nvPr>
+        </p:nvSpPr>
+        <p:spPr/>
+        <p:txBody>
+          <a:bodyPr/>
+          <a:lstStyle/>
+          <a:p>
+            <a:endParaRPr lang="sv-FI"/>
+          </a:p>
+        </p:txBody>
+      </p:sp>
+      <p:sp>
+        <p:nvSpPr>
+          <p:cNvPr id="3" name="Platshållare för innehåll 2">
+            <a:extLst>
+              <a:ext uri="{FF2B5EF4-FFF2-40B4-BE49-F238E27FC236}">
+                <a16:creationId xmlns:a16="http://schemas.microsoft.com/office/drawing/2014/main" id="{EA8724B4-3998-30B5-5918-AFCF1F326582}"/>
+              </a:ext>
+            </a:extLst>
+          </p:cNvPr>
+          <p:cNvSpPr>
+            <a:spLocks noGrp="1"/>
+          </p:cNvSpPr>
+          <p:nvPr>
+            <p:ph idx="1"/>
+          </p:nvPr>
+        </p:nvSpPr>
+        <p:spPr/>
+        <p:txBody>
+          <a:bodyPr/>
+          <a:lstStyle/>
+          <a:p>
+            <a:endParaRPr lang="sv-FI"/>
+          </a:p>
+        </p:txBody>
+      </p:sp>
+      <p:pic>
+        <p:nvPicPr>
+          <p:cNvPr id="4" name="Bildobjekt 3">
+            <a:extLst>
+              <a:ext uri="{FF2B5EF4-FFF2-40B4-BE49-F238E27FC236}">
+                <a16:creationId xmlns:a16="http://schemas.microsoft.com/office/drawing/2014/main" id="{960B2AA6-E0A6-81CF-A135-A1E2DB3E2897}"/>
+              </a:ext>
+            </a:extLst>
+          </p:cNvPr>
+          <p:cNvPicPr>
+            <a:picLocks noChangeAspect="1"/>
+          </p:cNvPicPr>
+          <p:nvPr/>
+        </p:nvPicPr>
+        <p:blipFill>
+          <a:blip r:embed="rId2"/>
+          <a:stretch>
+            <a:fillRect/>
+          </a:stretch>
+        </p:blipFill>
+        <p:spPr>
+          <a:xfrm>
+            <a:off x="38100" y="0"/>
+            <a:ext cx="6057900" cy="5486400"/>
+          </a:xfrm>
+          <a:prstGeom prst="rect">
+            <a:avLst/>
+          </a:prstGeom>
+        </p:spPr>
+      </p:pic>
+      <p:pic>
+        <p:nvPicPr>
+          <p:cNvPr id="5" name="Bildobjekt 4">
+            <a:extLst>
+              <a:ext uri="{FF2B5EF4-FFF2-40B4-BE49-F238E27FC236}">
+                <a16:creationId xmlns:a16="http://schemas.microsoft.com/office/drawing/2014/main" id="{E9911140-BC3B-CCD0-6349-D68D0106B4DA}"/>
+              </a:ext>
+            </a:extLst>
+          </p:cNvPr>
+          <p:cNvPicPr>
+            <a:picLocks noChangeAspect="1"/>
+          </p:cNvPicPr>
+          <p:nvPr/>
+        </p:nvPicPr>
+        <p:blipFill>
+          <a:blip r:embed="rId3"/>
+          <a:stretch>
+            <a:fillRect/>
+          </a:stretch>
+        </p:blipFill>
+        <p:spPr>
+          <a:xfrm>
+            <a:off x="6096000" y="0"/>
+            <a:ext cx="6057900" cy="5486400"/>
+          </a:xfrm>
+          <a:prstGeom prst="rect">
+            <a:avLst/>
+          </a:prstGeom>
+        </p:spPr>
+      </p:pic>
+    </p:spTree>
+    <p:extLst>
+      <p:ext uri="{BB962C8B-B14F-4D97-AF65-F5344CB8AC3E}">
+        <p14:creationId xmlns:p14="http://schemas.microsoft.com/office/powerpoint/2010/main" val="3303865552"/>
+      </p:ext>
+    </p:extLst>
+  </p:cSld>
+  <p:clrMapOvr>
+    <a:masterClrMapping/>
+  </p:clrMapOvr>
+</p:sld>
+</file>
+
+<file path=ppt/slides/slide23.xml><?xml version="1.0" encoding="utf-8"?>
+<p:sld xmlns:a="http://schemas.openxmlformats.org/drawingml/2006/main" xmlns:r="http://schemas.openxmlformats.org/officeDocument/2006/relationships" xmlns:p="http://schemas.openxmlformats.org/presentationml/2006/main">
+  <p:cSld>
+    <p:spTree>
+      <p:nvGrpSpPr>
+        <p:cNvPr id="1" name=""/>
+        <p:cNvGrpSpPr/>
+        <p:nvPr/>
+      </p:nvGrpSpPr>
+      <p:grpSpPr>
+        <a:xfrm>
+          <a:off x="0" y="0"/>
+          <a:ext cx="0" cy="0"/>
+          <a:chOff x="0" y="0"/>
+          <a:chExt cx="0" cy="0"/>
+        </a:xfrm>
+      </p:grpSpPr>
+      <p:sp>
+        <p:nvSpPr>
+          <p:cNvPr id="2" name="Rubrik 1">
+            <a:extLst>
+              <a:ext uri="{FF2B5EF4-FFF2-40B4-BE49-F238E27FC236}">
+                <a16:creationId xmlns:a16="http://schemas.microsoft.com/office/drawing/2014/main" id="{C2717675-6E5E-AD7D-F1B3-EAC015BB68CF}"/>
+              </a:ext>
+            </a:extLst>
+          </p:cNvPr>
+          <p:cNvSpPr>
+            <a:spLocks noGrp="1"/>
+          </p:cNvSpPr>
+          <p:nvPr>
+            <p:ph type="title"/>
+          </p:nvPr>
+        </p:nvSpPr>
+        <p:spPr/>
+        <p:txBody>
+          <a:bodyPr/>
+          <a:lstStyle/>
+          <a:p>
+            <a:endParaRPr lang="sv-FI"/>
+          </a:p>
+        </p:txBody>
+      </p:sp>
+      <p:sp>
+        <p:nvSpPr>
+          <p:cNvPr id="3" name="Platshållare för innehåll 2">
+            <a:extLst>
+              <a:ext uri="{FF2B5EF4-FFF2-40B4-BE49-F238E27FC236}">
+                <a16:creationId xmlns:a16="http://schemas.microsoft.com/office/drawing/2014/main" id="{1E2EDE2B-C533-ACD4-8D26-EB95438B4695}"/>
+              </a:ext>
+            </a:extLst>
+          </p:cNvPr>
+          <p:cNvSpPr>
+            <a:spLocks noGrp="1"/>
+          </p:cNvSpPr>
+          <p:nvPr>
+            <p:ph idx="1"/>
+          </p:nvPr>
+        </p:nvSpPr>
+        <p:spPr/>
+        <p:txBody>
+          <a:bodyPr/>
+          <a:lstStyle/>
+          <a:p>
+            <a:endParaRPr lang="sv-FI"/>
+          </a:p>
+        </p:txBody>
+      </p:sp>
+      <p:pic>
+        <p:nvPicPr>
+          <p:cNvPr id="5" name="Bildobjekt 4">
+            <a:extLst>
+              <a:ext uri="{FF2B5EF4-FFF2-40B4-BE49-F238E27FC236}">
+                <a16:creationId xmlns:a16="http://schemas.microsoft.com/office/drawing/2014/main" id="{B7DEBE0A-AD6A-07E9-2348-FC2D62D9E088}"/>
+              </a:ext>
+            </a:extLst>
+          </p:cNvPr>
+          <p:cNvPicPr>
+            <a:picLocks noChangeAspect="1"/>
+          </p:cNvPicPr>
+          <p:nvPr/>
+        </p:nvPicPr>
+        <p:blipFill>
+          <a:blip r:embed="rId2"/>
+          <a:stretch>
+            <a:fillRect/>
+          </a:stretch>
+        </p:blipFill>
+        <p:spPr>
+          <a:xfrm>
+            <a:off x="0" y="0"/>
+            <a:ext cx="6057900" cy="5486400"/>
+          </a:xfrm>
+          <a:prstGeom prst="rect">
+            <a:avLst/>
+          </a:prstGeom>
+        </p:spPr>
+      </p:pic>
+      <p:pic>
+        <p:nvPicPr>
+          <p:cNvPr id="6" name="Bildobjekt 5">
+            <a:extLst>
+              <a:ext uri="{FF2B5EF4-FFF2-40B4-BE49-F238E27FC236}">
+                <a16:creationId xmlns:a16="http://schemas.microsoft.com/office/drawing/2014/main" id="{30F40E27-15A3-45D0-FB98-C3748FD61D82}"/>
+              </a:ext>
+            </a:extLst>
+          </p:cNvPr>
+          <p:cNvPicPr>
+            <a:picLocks noChangeAspect="1"/>
+          </p:cNvPicPr>
+          <p:nvPr/>
+        </p:nvPicPr>
+        <p:blipFill>
+          <a:blip r:embed="rId3"/>
+          <a:stretch>
+            <a:fillRect/>
+          </a:stretch>
+        </p:blipFill>
+        <p:spPr>
+          <a:xfrm>
+            <a:off x="6057900" y="0"/>
+            <a:ext cx="6057900" cy="5486400"/>
+          </a:xfrm>
+          <a:prstGeom prst="rect">
+            <a:avLst/>
+          </a:prstGeom>
+        </p:spPr>
+      </p:pic>
+    </p:spTree>
+    <p:extLst>
+      <p:ext uri="{BB962C8B-B14F-4D97-AF65-F5344CB8AC3E}">
+        <p14:creationId xmlns:p14="http://schemas.microsoft.com/office/powerpoint/2010/main" val="2054561166"/>
+      </p:ext>
+    </p:extLst>
+  </p:cSld>
+  <p:clrMapOvr>
+    <a:masterClrMapping/>
+  </p:clrMapOvr>
+</p:sld>
+</file>
+
+<file path=ppt/slides/slide24.xml><?xml version="1.0" encoding="utf-8"?>
+<p:sld xmlns:a="http://schemas.openxmlformats.org/drawingml/2006/main" xmlns:r="http://schemas.openxmlformats.org/officeDocument/2006/relationships" xmlns:p="http://schemas.openxmlformats.org/presentationml/2006/main">
+  <p:cSld>
+    <p:spTree>
+      <p:nvGrpSpPr>
+        <p:cNvPr id="1" name=""/>
+        <p:cNvGrpSpPr/>
+        <p:nvPr/>
+      </p:nvGrpSpPr>
+      <p:grpSpPr>
+        <a:xfrm>
+          <a:off x="0" y="0"/>
+          <a:ext cx="0" cy="0"/>
+          <a:chOff x="0" y="0"/>
+          <a:chExt cx="0" cy="0"/>
+        </a:xfrm>
+      </p:grpSpPr>
+      <p:sp>
+        <p:nvSpPr>
+          <p:cNvPr id="2" name="Rubrik 1">
+            <a:extLst>
+              <a:ext uri="{FF2B5EF4-FFF2-40B4-BE49-F238E27FC236}">
+                <a16:creationId xmlns:a16="http://schemas.microsoft.com/office/drawing/2014/main" id="{36F4997A-7551-9EEF-73D3-EB5AC41D1D85}"/>
+              </a:ext>
+            </a:extLst>
+          </p:cNvPr>
+          <p:cNvSpPr>
+            <a:spLocks noGrp="1"/>
+          </p:cNvSpPr>
+          <p:nvPr>
+            <p:ph type="title"/>
+          </p:nvPr>
+        </p:nvSpPr>
+        <p:spPr/>
+        <p:txBody>
+          <a:bodyPr/>
+          <a:lstStyle/>
+          <a:p>
+            <a:endParaRPr lang="sv-FI"/>
+          </a:p>
+        </p:txBody>
+      </p:sp>
+      <p:sp>
+        <p:nvSpPr>
+          <p:cNvPr id="3" name="Platshållare för innehåll 2">
+            <a:extLst>
+              <a:ext uri="{FF2B5EF4-FFF2-40B4-BE49-F238E27FC236}">
+                <a16:creationId xmlns:a16="http://schemas.microsoft.com/office/drawing/2014/main" id="{01B0B2E7-456E-4355-6B4F-FA537B2E74CB}"/>
+              </a:ext>
+            </a:extLst>
+          </p:cNvPr>
+          <p:cNvSpPr>
+            <a:spLocks noGrp="1"/>
+          </p:cNvSpPr>
+          <p:nvPr>
+            <p:ph idx="1"/>
+          </p:nvPr>
+        </p:nvSpPr>
+        <p:spPr/>
+        <p:txBody>
+          <a:bodyPr/>
+          <a:lstStyle/>
+          <a:p>
+            <a:endParaRPr lang="sv-FI"/>
+          </a:p>
+        </p:txBody>
+      </p:sp>
+      <p:pic>
+        <p:nvPicPr>
+          <p:cNvPr id="4" name="Bildobjekt 3">
+            <a:extLst>
+              <a:ext uri="{FF2B5EF4-FFF2-40B4-BE49-F238E27FC236}">
+                <a16:creationId xmlns:a16="http://schemas.microsoft.com/office/drawing/2014/main" id="{C6B1CB2A-07C6-C6AF-B37E-D2D91F05A46A}"/>
+              </a:ext>
+            </a:extLst>
+          </p:cNvPr>
+          <p:cNvPicPr>
+            <a:picLocks noChangeAspect="1"/>
+          </p:cNvPicPr>
+          <p:nvPr/>
+        </p:nvPicPr>
+        <p:blipFill>
+          <a:blip r:embed="rId2"/>
+          <a:stretch>
+            <a:fillRect/>
+          </a:stretch>
+        </p:blipFill>
+        <p:spPr>
+          <a:xfrm>
+            <a:off x="0" y="0"/>
+            <a:ext cx="6057900" cy="5486400"/>
+          </a:xfrm>
+          <a:prstGeom prst="rect">
+            <a:avLst/>
+          </a:prstGeom>
+        </p:spPr>
+      </p:pic>
+      <p:pic>
+        <p:nvPicPr>
+          <p:cNvPr id="5" name="Bildobjekt 4">
+            <a:extLst>
+              <a:ext uri="{FF2B5EF4-FFF2-40B4-BE49-F238E27FC236}">
+                <a16:creationId xmlns:a16="http://schemas.microsoft.com/office/drawing/2014/main" id="{9F2F9B9D-1758-741A-35F3-A56156FEC08B}"/>
+              </a:ext>
+            </a:extLst>
+          </p:cNvPr>
+          <p:cNvPicPr>
+            <a:picLocks noChangeAspect="1"/>
+          </p:cNvPicPr>
+          <p:nvPr/>
+        </p:nvPicPr>
+        <p:blipFill>
+          <a:blip r:embed="rId3"/>
+          <a:stretch>
+            <a:fillRect/>
+          </a:stretch>
+        </p:blipFill>
+        <p:spPr>
+          <a:xfrm>
+            <a:off x="6096000" y="0"/>
+            <a:ext cx="6057900" cy="5486400"/>
+          </a:xfrm>
+          <a:prstGeom prst="rect">
+            <a:avLst/>
+          </a:prstGeom>
+        </p:spPr>
+      </p:pic>
+    </p:spTree>
+    <p:extLst>
+      <p:ext uri="{BB962C8B-B14F-4D97-AF65-F5344CB8AC3E}">
+        <p14:creationId xmlns:p14="http://schemas.microsoft.com/office/powerpoint/2010/main" val="399492300"/>
+      </p:ext>
+    </p:extLst>
+  </p:cSld>
+  <p:clrMapOvr>
+    <a:masterClrMapping/>
+  </p:clrMapOvr>
+</p:sld>
+</file>
+
+<file path=ppt/slides/slide25.xml><?xml version="1.0" encoding="utf-8"?>
+<p:sld xmlns:a="http://schemas.openxmlformats.org/drawingml/2006/main" xmlns:r="http://schemas.openxmlformats.org/officeDocument/2006/relationships" xmlns:p="http://schemas.openxmlformats.org/presentationml/2006/main">
+  <p:cSld>
+    <p:spTree>
+      <p:nvGrpSpPr>
+        <p:cNvPr id="1" name=""/>
+        <p:cNvGrpSpPr/>
+        <p:nvPr/>
+      </p:nvGrpSpPr>
+      <p:grpSpPr>
+        <a:xfrm>
+          <a:off x="0" y="0"/>
+          <a:ext cx="0" cy="0"/>
+          <a:chOff x="0" y="0"/>
+          <a:chExt cx="0" cy="0"/>
+        </a:xfrm>
+      </p:grpSpPr>
+      <p:sp>
+        <p:nvSpPr>
+          <p:cNvPr id="2" name="Rubrik 1">
+            <a:extLst>
+              <a:ext uri="{FF2B5EF4-FFF2-40B4-BE49-F238E27FC236}">
+                <a16:creationId xmlns:a16="http://schemas.microsoft.com/office/drawing/2014/main" id="{F7D30B7D-74FE-E60E-F628-E921211503E2}"/>
+              </a:ext>
+            </a:extLst>
+          </p:cNvPr>
+          <p:cNvSpPr>
+            <a:spLocks noGrp="1"/>
+          </p:cNvSpPr>
+          <p:nvPr>
+            <p:ph type="title"/>
+          </p:nvPr>
+        </p:nvSpPr>
+        <p:spPr/>
+        <p:txBody>
+          <a:bodyPr/>
+          <a:lstStyle/>
+          <a:p>
+            <a:endParaRPr lang="sv-FI"/>
+          </a:p>
+        </p:txBody>
+      </p:sp>
+      <p:sp>
+        <p:nvSpPr>
+          <p:cNvPr id="3" name="Platshållare för innehåll 2">
+            <a:extLst>
+              <a:ext uri="{FF2B5EF4-FFF2-40B4-BE49-F238E27FC236}">
+                <a16:creationId xmlns:a16="http://schemas.microsoft.com/office/drawing/2014/main" id="{E518EF04-4669-8800-652C-20E28C6A75B8}"/>
+              </a:ext>
+            </a:extLst>
+          </p:cNvPr>
+          <p:cNvSpPr>
+            <a:spLocks noGrp="1"/>
+          </p:cNvSpPr>
+          <p:nvPr>
+            <p:ph idx="1"/>
+          </p:nvPr>
+        </p:nvSpPr>
+        <p:spPr/>
+        <p:txBody>
+          <a:bodyPr/>
+          <a:lstStyle/>
+          <a:p>
+            <a:endParaRPr lang="sv-FI"/>
+          </a:p>
+        </p:txBody>
+      </p:sp>
+      <p:pic>
+        <p:nvPicPr>
+          <p:cNvPr id="4" name="Bildobjekt 3">
+            <a:extLst>
+              <a:ext uri="{FF2B5EF4-FFF2-40B4-BE49-F238E27FC236}">
+                <a16:creationId xmlns:a16="http://schemas.microsoft.com/office/drawing/2014/main" id="{70E334E0-2F4E-D5E6-43C8-486C36DFC7C5}"/>
+              </a:ext>
+            </a:extLst>
+          </p:cNvPr>
+          <p:cNvPicPr>
+            <a:picLocks noChangeAspect="1"/>
+          </p:cNvPicPr>
+          <p:nvPr/>
+        </p:nvPicPr>
+        <p:blipFill>
+          <a:blip r:embed="rId2"/>
+          <a:stretch>
+            <a:fillRect/>
+          </a:stretch>
+        </p:blipFill>
+        <p:spPr>
+          <a:xfrm>
+            <a:off x="38100" y="0"/>
+            <a:ext cx="6057900" cy="5486400"/>
+          </a:xfrm>
+          <a:prstGeom prst="rect">
+            <a:avLst/>
+          </a:prstGeom>
+        </p:spPr>
+      </p:pic>
+      <p:pic>
+        <p:nvPicPr>
+          <p:cNvPr id="5" name="Bildobjekt 4">
+            <a:extLst>
+              <a:ext uri="{FF2B5EF4-FFF2-40B4-BE49-F238E27FC236}">
+                <a16:creationId xmlns:a16="http://schemas.microsoft.com/office/drawing/2014/main" id="{42C100B9-87F2-7F91-83A3-ECB8576366D5}"/>
+              </a:ext>
+            </a:extLst>
+          </p:cNvPr>
+          <p:cNvPicPr>
+            <a:picLocks noChangeAspect="1"/>
+          </p:cNvPicPr>
+          <p:nvPr/>
+        </p:nvPicPr>
+        <p:blipFill>
+          <a:blip r:embed="rId3"/>
+          <a:stretch>
+            <a:fillRect/>
+          </a:stretch>
+        </p:blipFill>
+        <p:spPr>
+          <a:xfrm>
+            <a:off x="6134100" y="0"/>
+            <a:ext cx="6057900" cy="5486400"/>
+          </a:xfrm>
+          <a:prstGeom prst="rect">
+            <a:avLst/>
+          </a:prstGeom>
+        </p:spPr>
+      </p:pic>
+    </p:spTree>
+    <p:extLst>
+      <p:ext uri="{BB962C8B-B14F-4D97-AF65-F5344CB8AC3E}">
+        <p14:creationId xmlns:p14="http://schemas.microsoft.com/office/powerpoint/2010/main" val="410534866"/>
+      </p:ext>
+    </p:extLst>
+  </p:cSld>
+  <p:clrMapOvr>
+    <a:masterClrMapping/>
+  </p:clrMapOvr>
+</p:sld>
+</file>
+
+<file path=ppt/slides/slide26.xml><?xml version="1.0" encoding="utf-8"?>
+<p:sld xmlns:a="http://schemas.openxmlformats.org/drawingml/2006/main" xmlns:r="http://schemas.openxmlformats.org/officeDocument/2006/relationships" xmlns:p="http://schemas.openxmlformats.org/presentationml/2006/main">
+  <p:cSld>
+    <p:spTree>
+      <p:nvGrpSpPr>
+        <p:cNvPr id="1" name=""/>
+        <p:cNvGrpSpPr/>
+        <p:nvPr/>
+      </p:nvGrpSpPr>
+      <p:grpSpPr>
+        <a:xfrm>
+          <a:off x="0" y="0"/>
+          <a:ext cx="0" cy="0"/>
+          <a:chOff x="0" y="0"/>
+          <a:chExt cx="0" cy="0"/>
+        </a:xfrm>
+      </p:grpSpPr>
+      <p:sp>
+        <p:nvSpPr>
+          <p:cNvPr id="2" name="Rubrik 1">
+            <a:extLst>
+              <a:ext uri="{FF2B5EF4-FFF2-40B4-BE49-F238E27FC236}">
+                <a16:creationId xmlns:a16="http://schemas.microsoft.com/office/drawing/2014/main" id="{8BDB9649-2873-BF4D-A4BF-9E0E27EDA36E}"/>
+              </a:ext>
+            </a:extLst>
+          </p:cNvPr>
+          <p:cNvSpPr>
+            <a:spLocks noGrp="1"/>
+          </p:cNvSpPr>
+          <p:nvPr>
+            <p:ph type="title"/>
+          </p:nvPr>
+        </p:nvSpPr>
+        <p:spPr/>
+        <p:txBody>
+          <a:bodyPr/>
+          <a:lstStyle/>
+          <a:p>
+            <a:endParaRPr lang="sv-FI"/>
+          </a:p>
+        </p:txBody>
+      </p:sp>
+      <p:sp>
+        <p:nvSpPr>
+          <p:cNvPr id="3" name="Platshållare för innehåll 2">
+            <a:extLst>
+              <a:ext uri="{FF2B5EF4-FFF2-40B4-BE49-F238E27FC236}">
+                <a16:creationId xmlns:a16="http://schemas.microsoft.com/office/drawing/2014/main" id="{A1A39BB7-B417-54C6-3402-BEF467F2145E}"/>
+              </a:ext>
+            </a:extLst>
+          </p:cNvPr>
+          <p:cNvSpPr>
+            <a:spLocks noGrp="1"/>
+          </p:cNvSpPr>
+          <p:nvPr>
+            <p:ph idx="1"/>
+          </p:nvPr>
+        </p:nvSpPr>
+        <p:spPr/>
+        <p:txBody>
+          <a:bodyPr/>
+          <a:lstStyle/>
+          <a:p>
+            <a:endParaRPr lang="sv-FI"/>
+          </a:p>
+        </p:txBody>
+      </p:sp>
+      <p:pic>
+        <p:nvPicPr>
+          <p:cNvPr id="4" name="Bildobjekt 3">
+            <a:extLst>
+              <a:ext uri="{FF2B5EF4-FFF2-40B4-BE49-F238E27FC236}">
+                <a16:creationId xmlns:a16="http://schemas.microsoft.com/office/drawing/2014/main" id="{800B8CE8-0062-9512-00C5-E78519578A45}"/>
+              </a:ext>
+            </a:extLst>
+          </p:cNvPr>
+          <p:cNvPicPr>
+            <a:picLocks noChangeAspect="1"/>
+          </p:cNvPicPr>
+          <p:nvPr/>
+        </p:nvPicPr>
+        <p:blipFill>
+          <a:blip r:embed="rId2"/>
+          <a:stretch>
+            <a:fillRect/>
+          </a:stretch>
+        </p:blipFill>
+        <p:spPr>
+          <a:xfrm>
+            <a:off x="0" y="0"/>
+            <a:ext cx="6057900" cy="5486400"/>
+          </a:xfrm>
+          <a:prstGeom prst="rect">
+            <a:avLst/>
+          </a:prstGeom>
+        </p:spPr>
+      </p:pic>
+      <p:pic>
+        <p:nvPicPr>
+          <p:cNvPr id="5" name="Bildobjekt 4">
+            <a:extLst>
+              <a:ext uri="{FF2B5EF4-FFF2-40B4-BE49-F238E27FC236}">
+                <a16:creationId xmlns:a16="http://schemas.microsoft.com/office/drawing/2014/main" id="{EE4378B8-E181-7EBD-8580-512D7FBDC4B4}"/>
+              </a:ext>
+            </a:extLst>
+          </p:cNvPr>
+          <p:cNvPicPr>
+            <a:picLocks noChangeAspect="1"/>
+          </p:cNvPicPr>
+          <p:nvPr/>
+        </p:nvPicPr>
+        <p:blipFill>
+          <a:blip r:embed="rId3"/>
+          <a:stretch>
+            <a:fillRect/>
+          </a:stretch>
+        </p:blipFill>
+        <p:spPr>
+          <a:xfrm>
+            <a:off x="6122263" y="0"/>
+            <a:ext cx="6057900" cy="5486400"/>
+          </a:xfrm>
+          <a:prstGeom prst="rect">
+            <a:avLst/>
+          </a:prstGeom>
+        </p:spPr>
+      </p:pic>
+    </p:spTree>
+    <p:extLst>
+      <p:ext uri="{BB962C8B-B14F-4D97-AF65-F5344CB8AC3E}">
+        <p14:creationId xmlns:p14="http://schemas.microsoft.com/office/powerpoint/2010/main" val="2567101156"/>
+      </p:ext>
+    </p:extLst>
+  </p:cSld>
+  <p:clrMapOvr>
+    <a:masterClrMapping/>
+  </p:clrMapOvr>
+</p:sld>
+</file>
+
+<file path=ppt/slides/slide27.xml><?xml version="1.0" encoding="utf-8"?>
+<p:sld xmlns:a="http://schemas.openxmlformats.org/drawingml/2006/main" xmlns:r="http://schemas.openxmlformats.org/officeDocument/2006/relationships" xmlns:p="http://schemas.openxmlformats.org/presentationml/2006/main">
+  <p:cSld>
+    <p:spTree>
+      <p:nvGrpSpPr>
+        <p:cNvPr id="1" name=""/>
+        <p:cNvGrpSpPr/>
+        <p:nvPr/>
+      </p:nvGrpSpPr>
+      <p:grpSpPr>
+        <a:xfrm>
+          <a:off x="0" y="0"/>
+          <a:ext cx="0" cy="0"/>
+          <a:chOff x="0" y="0"/>
+          <a:chExt cx="0" cy="0"/>
+        </a:xfrm>
+      </p:grpSpPr>
+      <p:sp>
+        <p:nvSpPr>
+          <p:cNvPr id="2" name="Rubrik 1">
+            <a:extLst>
+              <a:ext uri="{FF2B5EF4-FFF2-40B4-BE49-F238E27FC236}">
+                <a16:creationId xmlns:a16="http://schemas.microsoft.com/office/drawing/2014/main" id="{65DA99D5-2C67-5E3D-5892-B38C2FC8F5C4}"/>
+              </a:ext>
+            </a:extLst>
+          </p:cNvPr>
+          <p:cNvSpPr>
+            <a:spLocks noGrp="1"/>
+          </p:cNvSpPr>
+          <p:nvPr>
+            <p:ph type="title"/>
+          </p:nvPr>
+        </p:nvSpPr>
+        <p:spPr/>
+        <p:txBody>
+          <a:bodyPr/>
+          <a:lstStyle/>
+          <a:p>
+            <a:endParaRPr lang="sv-FI"/>
+          </a:p>
+        </p:txBody>
+      </p:sp>
+      <p:sp>
+        <p:nvSpPr>
+          <p:cNvPr id="3" name="Platshållare för innehåll 2">
+            <a:extLst>
+              <a:ext uri="{FF2B5EF4-FFF2-40B4-BE49-F238E27FC236}">
+                <a16:creationId xmlns:a16="http://schemas.microsoft.com/office/drawing/2014/main" id="{89D85E2E-2745-8C18-3D1C-B7C9DAC3C624}"/>
+              </a:ext>
+            </a:extLst>
+          </p:cNvPr>
+          <p:cNvSpPr>
+            <a:spLocks noGrp="1"/>
+          </p:cNvSpPr>
+          <p:nvPr>
+            <p:ph idx="1"/>
+          </p:nvPr>
+        </p:nvSpPr>
+        <p:spPr/>
+        <p:txBody>
+          <a:bodyPr/>
+          <a:lstStyle/>
+          <a:p>
+            <a:endParaRPr lang="sv-FI"/>
+          </a:p>
+        </p:txBody>
+      </p:sp>
+      <p:pic>
+        <p:nvPicPr>
+          <p:cNvPr id="4" name="Bildobjekt 3">
+            <a:extLst>
+              <a:ext uri="{FF2B5EF4-FFF2-40B4-BE49-F238E27FC236}">
+                <a16:creationId xmlns:a16="http://schemas.microsoft.com/office/drawing/2014/main" id="{7BFDF811-7E2F-E9C0-89DE-F75C1312456A}"/>
+              </a:ext>
+            </a:extLst>
+          </p:cNvPr>
+          <p:cNvPicPr>
+            <a:picLocks noChangeAspect="1"/>
+          </p:cNvPicPr>
+          <p:nvPr/>
+        </p:nvPicPr>
+        <p:blipFill>
+          <a:blip r:embed="rId2"/>
+          <a:stretch>
+            <a:fillRect/>
+          </a:stretch>
+        </p:blipFill>
+        <p:spPr>
+          <a:xfrm>
+            <a:off x="0" y="-6658"/>
+            <a:ext cx="6057900" cy="5486400"/>
+          </a:xfrm>
+          <a:prstGeom prst="rect">
+            <a:avLst/>
+          </a:prstGeom>
+        </p:spPr>
+      </p:pic>
+      <p:pic>
+        <p:nvPicPr>
+          <p:cNvPr id="5" name="Bildobjekt 4">
+            <a:extLst>
+              <a:ext uri="{FF2B5EF4-FFF2-40B4-BE49-F238E27FC236}">
+                <a16:creationId xmlns:a16="http://schemas.microsoft.com/office/drawing/2014/main" id="{3E7D54F2-7EA8-5759-E7D4-90B9F3CF9517}"/>
+              </a:ext>
+            </a:extLst>
+          </p:cNvPr>
+          <p:cNvPicPr>
+            <a:picLocks noChangeAspect="1"/>
+          </p:cNvPicPr>
+          <p:nvPr/>
+        </p:nvPicPr>
+        <p:blipFill>
+          <a:blip r:embed="rId3"/>
+          <a:stretch>
+            <a:fillRect/>
+          </a:stretch>
+        </p:blipFill>
+        <p:spPr>
+          <a:xfrm>
+            <a:off x="6096000" y="0"/>
+            <a:ext cx="6057900" cy="5486400"/>
+          </a:xfrm>
+          <a:prstGeom prst="rect">
+            <a:avLst/>
+          </a:prstGeom>
+        </p:spPr>
+      </p:pic>
+    </p:spTree>
+    <p:extLst>
+      <p:ext uri="{BB962C8B-B14F-4D97-AF65-F5344CB8AC3E}">
+        <p14:creationId xmlns:p14="http://schemas.microsoft.com/office/powerpoint/2010/main" val="3537692794"/>
+      </p:ext>
+    </p:extLst>
+  </p:cSld>
+  <p:clrMapOvr>
+    <a:masterClrMapping/>
+  </p:clrMapOvr>
+</p:sld>
+</file>
+
+<file path=ppt/slides/slide28.xml><?xml version="1.0" encoding="utf-8"?>
+<p:sld xmlns:a="http://schemas.openxmlformats.org/drawingml/2006/main" xmlns:r="http://schemas.openxmlformats.org/officeDocument/2006/relationships" xmlns:p="http://schemas.openxmlformats.org/presentationml/2006/main">
+  <p:cSld>
+    <p:spTree>
+      <p:nvGrpSpPr>
+        <p:cNvPr id="1" name=""/>
+        <p:cNvGrpSpPr/>
+        <p:nvPr/>
+      </p:nvGrpSpPr>
+      <p:grpSpPr>
+        <a:xfrm>
+          <a:off x="0" y="0"/>
+          <a:ext cx="0" cy="0"/>
+          <a:chOff x="0" y="0"/>
+          <a:chExt cx="0" cy="0"/>
+        </a:xfrm>
+      </p:grpSpPr>
+      <p:sp>
+        <p:nvSpPr>
+          <p:cNvPr id="2" name="Rubrik 1">
+            <a:extLst>
+              <a:ext uri="{FF2B5EF4-FFF2-40B4-BE49-F238E27FC236}">
+                <a16:creationId xmlns:a16="http://schemas.microsoft.com/office/drawing/2014/main" id="{43211D21-9F5A-9308-7B1F-0DDDB3B7F28F}"/>
+              </a:ext>
+            </a:extLst>
+          </p:cNvPr>
+          <p:cNvSpPr>
+            <a:spLocks noGrp="1"/>
+          </p:cNvSpPr>
+          <p:nvPr>
+            <p:ph type="title"/>
+          </p:nvPr>
+        </p:nvSpPr>
+        <p:spPr/>
+        <p:txBody>
+          <a:bodyPr/>
+          <a:lstStyle/>
+          <a:p>
+            <a:endParaRPr lang="sv-FI"/>
+          </a:p>
+        </p:txBody>
+      </p:sp>
+      <p:sp>
+        <p:nvSpPr>
+          <p:cNvPr id="3" name="Platshållare för innehåll 2">
+            <a:extLst>
+              <a:ext uri="{FF2B5EF4-FFF2-40B4-BE49-F238E27FC236}">
+                <a16:creationId xmlns:a16="http://schemas.microsoft.com/office/drawing/2014/main" id="{67853C38-1729-F681-BDEE-E85EE863956B}"/>
+              </a:ext>
+            </a:extLst>
+          </p:cNvPr>
+          <p:cNvSpPr>
+            <a:spLocks noGrp="1"/>
+          </p:cNvSpPr>
+          <p:nvPr>
+            <p:ph idx="1"/>
+          </p:nvPr>
+        </p:nvSpPr>
+        <p:spPr/>
+        <p:txBody>
+          <a:bodyPr/>
+          <a:lstStyle/>
+          <a:p>
+            <a:endParaRPr lang="sv-FI"/>
+          </a:p>
+        </p:txBody>
+      </p:sp>
+      <p:pic>
+        <p:nvPicPr>
+          <p:cNvPr id="4" name="Bildobjekt 3">
+            <a:extLst>
+              <a:ext uri="{FF2B5EF4-FFF2-40B4-BE49-F238E27FC236}">
+                <a16:creationId xmlns:a16="http://schemas.microsoft.com/office/drawing/2014/main" id="{72CF1847-8030-3B41-5BCA-4FA96CCD1718}"/>
+              </a:ext>
+            </a:extLst>
+          </p:cNvPr>
+          <p:cNvPicPr>
+            <a:picLocks noChangeAspect="1"/>
+          </p:cNvPicPr>
+          <p:nvPr/>
+        </p:nvPicPr>
+        <p:blipFill>
+          <a:blip r:embed="rId2"/>
+          <a:stretch>
+            <a:fillRect/>
+          </a:stretch>
+        </p:blipFill>
+        <p:spPr>
+          <a:xfrm>
+            <a:off x="38100" y="0"/>
+            <a:ext cx="6057900" cy="5486400"/>
+          </a:xfrm>
+          <a:prstGeom prst="rect">
+            <a:avLst/>
+          </a:prstGeom>
+        </p:spPr>
+      </p:pic>
+      <p:pic>
+        <p:nvPicPr>
+          <p:cNvPr id="5" name="Bildobjekt 4">
+            <a:extLst>
+              <a:ext uri="{FF2B5EF4-FFF2-40B4-BE49-F238E27FC236}">
+                <a16:creationId xmlns:a16="http://schemas.microsoft.com/office/drawing/2014/main" id="{2C759C6F-CC02-FEE3-45D8-0A003DEDF610}"/>
+              </a:ext>
+            </a:extLst>
+          </p:cNvPr>
+          <p:cNvPicPr>
+            <a:picLocks noChangeAspect="1"/>
+          </p:cNvPicPr>
+          <p:nvPr/>
+        </p:nvPicPr>
+        <p:blipFill>
+          <a:blip r:embed="rId3"/>
+          <a:stretch>
+            <a:fillRect/>
+          </a:stretch>
+        </p:blipFill>
+        <p:spPr>
+          <a:xfrm>
+            <a:off x="6096000" y="0"/>
+            <a:ext cx="6057900" cy="5486400"/>
+          </a:xfrm>
+          <a:prstGeom prst="rect">
+            <a:avLst/>
+          </a:prstGeom>
+        </p:spPr>
+      </p:pic>
+    </p:spTree>
+    <p:extLst>
+      <p:ext uri="{BB962C8B-B14F-4D97-AF65-F5344CB8AC3E}">
+        <p14:creationId xmlns:p14="http://schemas.microsoft.com/office/powerpoint/2010/main" val="124367956"/>
+      </p:ext>
+    </p:extLst>
+  </p:cSld>
+  <p:clrMapOvr>
+    <a:masterClrMapping/>
+  </p:clrMapOvr>
+</p:sld>
+</file>
+
+<file path=ppt/slides/slide29.xml><?xml version="1.0" encoding="utf-8"?>
+<p:sld xmlns:a="http://schemas.openxmlformats.org/drawingml/2006/main" xmlns:r="http://schemas.openxmlformats.org/officeDocument/2006/relationships" xmlns:p="http://schemas.openxmlformats.org/presentationml/2006/main">
+  <p:cSld>
+    <p:spTree>
+      <p:nvGrpSpPr>
+        <p:cNvPr id="1" name=""/>
+        <p:cNvGrpSpPr/>
+        <p:nvPr/>
+      </p:nvGrpSpPr>
+      <p:grpSpPr>
+        <a:xfrm>
+          <a:off x="0" y="0"/>
+          <a:ext cx="0" cy="0"/>
+          <a:chOff x="0" y="0"/>
+          <a:chExt cx="0" cy="0"/>
+        </a:xfrm>
+      </p:grpSpPr>
+      <p:sp>
+        <p:nvSpPr>
+          <p:cNvPr id="2" name="Rubrik 1">
+            <a:extLst>
+              <a:ext uri="{FF2B5EF4-FFF2-40B4-BE49-F238E27FC236}">
+                <a16:creationId xmlns:a16="http://schemas.microsoft.com/office/drawing/2014/main" id="{986688E6-C598-58F1-34B6-8C23E094D8DD}"/>
+              </a:ext>
+            </a:extLst>
+          </p:cNvPr>
+          <p:cNvSpPr>
+            <a:spLocks noGrp="1"/>
+          </p:cNvSpPr>
+          <p:nvPr>
+            <p:ph type="title"/>
+          </p:nvPr>
+        </p:nvSpPr>
+        <p:spPr/>
+        <p:txBody>
+          <a:bodyPr/>
+          <a:lstStyle/>
+          <a:p>
+            <a:endParaRPr lang="sv-FI"/>
+          </a:p>
+        </p:txBody>
+      </p:sp>
+      <p:sp>
+        <p:nvSpPr>
+          <p:cNvPr id="3" name="Platshållare för innehåll 2">
+            <a:extLst>
+              <a:ext uri="{FF2B5EF4-FFF2-40B4-BE49-F238E27FC236}">
+                <a16:creationId xmlns:a16="http://schemas.microsoft.com/office/drawing/2014/main" id="{33D165C3-6CDD-29A6-6475-F1C4520BD704}"/>
+              </a:ext>
+            </a:extLst>
+          </p:cNvPr>
+          <p:cNvSpPr>
+            <a:spLocks noGrp="1"/>
+          </p:cNvSpPr>
+          <p:nvPr>
+            <p:ph idx="1"/>
+          </p:nvPr>
+        </p:nvSpPr>
+        <p:spPr/>
+        <p:txBody>
+          <a:bodyPr/>
+          <a:lstStyle/>
+          <a:p>
+            <a:endParaRPr lang="sv-FI" dirty="0"/>
+          </a:p>
+        </p:txBody>
+      </p:sp>
+      <p:pic>
+        <p:nvPicPr>
+          <p:cNvPr id="4" name="Bildobjekt 3">
+            <a:extLst>
+              <a:ext uri="{FF2B5EF4-FFF2-40B4-BE49-F238E27FC236}">
+                <a16:creationId xmlns:a16="http://schemas.microsoft.com/office/drawing/2014/main" id="{F1EC7830-DBA9-AF04-3B43-7FC43C90199D}"/>
+              </a:ext>
+            </a:extLst>
+          </p:cNvPr>
+          <p:cNvPicPr>
+            <a:picLocks noChangeAspect="1"/>
+          </p:cNvPicPr>
+          <p:nvPr/>
+        </p:nvPicPr>
+        <p:blipFill>
+          <a:blip r:embed="rId2"/>
+          <a:stretch>
+            <a:fillRect/>
+          </a:stretch>
+        </p:blipFill>
+        <p:spPr>
+          <a:xfrm>
+            <a:off x="1" y="1"/>
+            <a:ext cx="5966866" cy="4421079"/>
+          </a:xfrm>
+          <a:prstGeom prst="rect">
+            <a:avLst/>
+          </a:prstGeom>
+        </p:spPr>
+      </p:pic>
+      <p:pic>
+        <p:nvPicPr>
+          <p:cNvPr id="6" name="Bildobjekt 5">
+            <a:extLst>
+              <a:ext uri="{FF2B5EF4-FFF2-40B4-BE49-F238E27FC236}">
+                <a16:creationId xmlns:a16="http://schemas.microsoft.com/office/drawing/2014/main" id="{FE56ECD6-3385-1C6B-EBCB-3D44B3F664D1}"/>
+              </a:ext>
+            </a:extLst>
+          </p:cNvPr>
+          <p:cNvPicPr>
+            <a:picLocks noChangeAspect="1"/>
+          </p:cNvPicPr>
+          <p:nvPr/>
+        </p:nvPicPr>
+        <p:blipFill>
+          <a:blip r:embed="rId3"/>
+          <a:stretch>
+            <a:fillRect/>
+          </a:stretch>
+        </p:blipFill>
+        <p:spPr>
+          <a:xfrm>
+            <a:off x="6096000" y="1"/>
+            <a:ext cx="5966866" cy="4421079"/>
+          </a:xfrm>
+          <a:prstGeom prst="rect">
+            <a:avLst/>
+          </a:prstGeom>
+        </p:spPr>
+      </p:pic>
+      <p:pic>
+        <p:nvPicPr>
+          <p:cNvPr id="9" name="Bildobjekt 8">
+            <a:extLst>
+              <a:ext uri="{FF2B5EF4-FFF2-40B4-BE49-F238E27FC236}">
+                <a16:creationId xmlns:a16="http://schemas.microsoft.com/office/drawing/2014/main" id="{C7602BDD-09EF-AEA0-B08E-0E59C38ADEEE}"/>
+              </a:ext>
+            </a:extLst>
+          </p:cNvPr>
+          <p:cNvPicPr>
+            <a:picLocks noChangeAspect="1"/>
+          </p:cNvPicPr>
+          <p:nvPr/>
+        </p:nvPicPr>
+        <p:blipFill>
+          <a:blip r:embed="rId4"/>
+          <a:stretch>
+            <a:fillRect/>
+          </a:stretch>
+        </p:blipFill>
+        <p:spPr>
+          <a:xfrm>
+            <a:off x="3201780" y="2736605"/>
+            <a:ext cx="5530173" cy="4099197"/>
+          </a:xfrm>
+          <a:prstGeom prst="rect">
+            <a:avLst/>
+          </a:prstGeom>
+        </p:spPr>
+      </p:pic>
+    </p:spTree>
+    <p:extLst>
+      <p:ext uri="{BB962C8B-B14F-4D97-AF65-F5344CB8AC3E}">
+        <p14:creationId xmlns:p14="http://schemas.microsoft.com/office/powerpoint/2010/main" val="1218562546"/>
+      </p:ext>
+    </p:extLst>
+  </p:cSld>
+  <p:clrMapOvr>
+    <a:masterClrMapping/>
+  </p:clrMapOvr>
+</p:sld>
+</file>
+
 <file path=ppt/slides/slide3.xml><?xml version="1.0" encoding="utf-8"?>
 <p:sld xmlns:a="http://schemas.openxmlformats.org/drawingml/2006/main" xmlns:r="http://schemas.openxmlformats.org/officeDocument/2006/relationships" xmlns:p="http://schemas.openxmlformats.org/presentationml/2006/main">
   <p:cSld>
@@ -5943,6 +7216,642 @@
     <p:extLst>
       <p:ext uri="{BB962C8B-B14F-4D97-AF65-F5344CB8AC3E}">
         <p14:creationId xmlns:p14="http://schemas.microsoft.com/office/powerpoint/2010/main" val="1998335437"/>
+      </p:ext>
+    </p:extLst>
+  </p:cSld>
+  <p:clrMapOvr>
+    <a:masterClrMapping/>
+  </p:clrMapOvr>
+</p:sld>
+</file>
+
+<file path=ppt/slides/slide30.xml><?xml version="1.0" encoding="utf-8"?>
+<p:sld xmlns:a="http://schemas.openxmlformats.org/drawingml/2006/main" xmlns:r="http://schemas.openxmlformats.org/officeDocument/2006/relationships" xmlns:p="http://schemas.openxmlformats.org/presentationml/2006/main">
+  <p:cSld>
+    <p:spTree>
+      <p:nvGrpSpPr>
+        <p:cNvPr id="1" name=""/>
+        <p:cNvGrpSpPr/>
+        <p:nvPr/>
+      </p:nvGrpSpPr>
+      <p:grpSpPr>
+        <a:xfrm>
+          <a:off x="0" y="0"/>
+          <a:ext cx="0" cy="0"/>
+          <a:chOff x="0" y="0"/>
+          <a:chExt cx="0" cy="0"/>
+        </a:xfrm>
+      </p:grpSpPr>
+      <p:sp>
+        <p:nvSpPr>
+          <p:cNvPr id="2" name="Rubrik 1">
+            <a:extLst>
+              <a:ext uri="{FF2B5EF4-FFF2-40B4-BE49-F238E27FC236}">
+                <a16:creationId xmlns:a16="http://schemas.microsoft.com/office/drawing/2014/main" id="{37F82123-0FCB-2425-3436-E45BD55BDE50}"/>
+              </a:ext>
+            </a:extLst>
+          </p:cNvPr>
+          <p:cNvSpPr>
+            <a:spLocks noGrp="1"/>
+          </p:cNvSpPr>
+          <p:nvPr>
+            <p:ph type="title"/>
+          </p:nvPr>
+        </p:nvSpPr>
+        <p:spPr/>
+        <p:txBody>
+          <a:bodyPr/>
+          <a:lstStyle/>
+          <a:p>
+            <a:endParaRPr lang="sv-FI"/>
+          </a:p>
+        </p:txBody>
+      </p:sp>
+      <p:sp>
+        <p:nvSpPr>
+          <p:cNvPr id="3" name="Platshållare för innehåll 2">
+            <a:extLst>
+              <a:ext uri="{FF2B5EF4-FFF2-40B4-BE49-F238E27FC236}">
+                <a16:creationId xmlns:a16="http://schemas.microsoft.com/office/drawing/2014/main" id="{845C024C-151E-1AF4-5171-81707FC15F81}"/>
+              </a:ext>
+            </a:extLst>
+          </p:cNvPr>
+          <p:cNvSpPr>
+            <a:spLocks noGrp="1"/>
+          </p:cNvSpPr>
+          <p:nvPr>
+            <p:ph idx="1"/>
+          </p:nvPr>
+        </p:nvSpPr>
+        <p:spPr/>
+        <p:txBody>
+          <a:bodyPr/>
+          <a:lstStyle/>
+          <a:p>
+            <a:endParaRPr lang="sv-FI"/>
+          </a:p>
+        </p:txBody>
+      </p:sp>
+      <p:pic>
+        <p:nvPicPr>
+          <p:cNvPr id="4" name="Bildobjekt 3">
+            <a:extLst>
+              <a:ext uri="{FF2B5EF4-FFF2-40B4-BE49-F238E27FC236}">
+                <a16:creationId xmlns:a16="http://schemas.microsoft.com/office/drawing/2014/main" id="{E46BAF0A-7502-589C-9C56-5CD7B9EC98CA}"/>
+              </a:ext>
+            </a:extLst>
+          </p:cNvPr>
+          <p:cNvPicPr>
+            <a:picLocks noChangeAspect="1"/>
+          </p:cNvPicPr>
+          <p:nvPr/>
+        </p:nvPicPr>
+        <p:blipFill>
+          <a:blip r:embed="rId2"/>
+          <a:stretch>
+            <a:fillRect/>
+          </a:stretch>
+        </p:blipFill>
+        <p:spPr>
+          <a:xfrm>
+            <a:off x="2218389" y="807868"/>
+            <a:ext cx="7579440" cy="5275713"/>
+          </a:xfrm>
+          <a:prstGeom prst="rect">
+            <a:avLst/>
+          </a:prstGeom>
+        </p:spPr>
+      </p:pic>
+    </p:spTree>
+    <p:extLst>
+      <p:ext uri="{BB962C8B-B14F-4D97-AF65-F5344CB8AC3E}">
+        <p14:creationId xmlns:p14="http://schemas.microsoft.com/office/powerpoint/2010/main" val="3726974253"/>
+      </p:ext>
+    </p:extLst>
+  </p:cSld>
+  <p:clrMapOvr>
+    <a:masterClrMapping/>
+  </p:clrMapOvr>
+</p:sld>
+</file>
+
+<file path=ppt/slides/slide31.xml><?xml version="1.0" encoding="utf-8"?>
+<p:sld xmlns:a="http://schemas.openxmlformats.org/drawingml/2006/main" xmlns:r="http://schemas.openxmlformats.org/officeDocument/2006/relationships" xmlns:p="http://schemas.openxmlformats.org/presentationml/2006/main">
+  <p:cSld>
+    <p:spTree>
+      <p:nvGrpSpPr>
+        <p:cNvPr id="1" name=""/>
+        <p:cNvGrpSpPr/>
+        <p:nvPr/>
+      </p:nvGrpSpPr>
+      <p:grpSpPr>
+        <a:xfrm>
+          <a:off x="0" y="0"/>
+          <a:ext cx="0" cy="0"/>
+          <a:chOff x="0" y="0"/>
+          <a:chExt cx="0" cy="0"/>
+        </a:xfrm>
+      </p:grpSpPr>
+      <p:sp>
+        <p:nvSpPr>
+          <p:cNvPr id="2" name="Rubrik 1">
+            <a:extLst>
+              <a:ext uri="{FF2B5EF4-FFF2-40B4-BE49-F238E27FC236}">
+                <a16:creationId xmlns:a16="http://schemas.microsoft.com/office/drawing/2014/main" id="{5D698CB6-7A71-E796-FE7B-12799D987B8A}"/>
+              </a:ext>
+            </a:extLst>
+          </p:cNvPr>
+          <p:cNvSpPr>
+            <a:spLocks noGrp="1"/>
+          </p:cNvSpPr>
+          <p:nvPr>
+            <p:ph type="title"/>
+          </p:nvPr>
+        </p:nvSpPr>
+        <p:spPr/>
+        <p:txBody>
+          <a:bodyPr/>
+          <a:lstStyle/>
+          <a:p>
+            <a:endParaRPr lang="sv-FI"/>
+          </a:p>
+        </p:txBody>
+      </p:sp>
+      <p:sp>
+        <p:nvSpPr>
+          <p:cNvPr id="3" name="Platshållare för innehåll 2">
+            <a:extLst>
+              <a:ext uri="{FF2B5EF4-FFF2-40B4-BE49-F238E27FC236}">
+                <a16:creationId xmlns:a16="http://schemas.microsoft.com/office/drawing/2014/main" id="{C882EE1D-85AF-D4C3-A446-773D14AC12EA}"/>
+              </a:ext>
+            </a:extLst>
+          </p:cNvPr>
+          <p:cNvSpPr>
+            <a:spLocks noGrp="1"/>
+          </p:cNvSpPr>
+          <p:nvPr>
+            <p:ph idx="1"/>
+          </p:nvPr>
+        </p:nvSpPr>
+        <p:spPr/>
+        <p:txBody>
+          <a:bodyPr/>
+          <a:lstStyle/>
+          <a:p>
+            <a:endParaRPr lang="sv-FI" dirty="0"/>
+          </a:p>
+        </p:txBody>
+      </p:sp>
+      <p:pic>
+        <p:nvPicPr>
+          <p:cNvPr id="4" name="Bildobjekt 3">
+            <a:extLst>
+              <a:ext uri="{FF2B5EF4-FFF2-40B4-BE49-F238E27FC236}">
+                <a16:creationId xmlns:a16="http://schemas.microsoft.com/office/drawing/2014/main" id="{AA0557CD-778B-91F2-266D-1E81B2FC562B}"/>
+              </a:ext>
+            </a:extLst>
+          </p:cNvPr>
+          <p:cNvPicPr>
+            <a:picLocks noChangeAspect="1"/>
+          </p:cNvPicPr>
+          <p:nvPr/>
+        </p:nvPicPr>
+        <p:blipFill>
+          <a:blip r:embed="rId2"/>
+          <a:stretch>
+            <a:fillRect/>
+          </a:stretch>
+        </p:blipFill>
+        <p:spPr>
+          <a:xfrm>
+            <a:off x="908841" y="53268"/>
+            <a:ext cx="4749196" cy="3303262"/>
+          </a:xfrm>
+          <a:prstGeom prst="rect">
+            <a:avLst/>
+          </a:prstGeom>
+        </p:spPr>
+      </p:pic>
+      <p:pic>
+        <p:nvPicPr>
+          <p:cNvPr id="5" name="Bildobjekt 4">
+            <a:extLst>
+              <a:ext uri="{FF2B5EF4-FFF2-40B4-BE49-F238E27FC236}">
+                <a16:creationId xmlns:a16="http://schemas.microsoft.com/office/drawing/2014/main" id="{6EFF18F9-B557-AB4D-188A-1B541B98D269}"/>
+              </a:ext>
+            </a:extLst>
+          </p:cNvPr>
+          <p:cNvPicPr>
+            <a:picLocks noChangeAspect="1"/>
+          </p:cNvPicPr>
+          <p:nvPr/>
+        </p:nvPicPr>
+        <p:blipFill>
+          <a:blip r:embed="rId3">
+            <a:extLst>
+              <a:ext uri="{28A0092B-C50C-407E-A947-70E740481C1C}">
+                <a14:useLocalDpi xmlns:a14="http://schemas.microsoft.com/office/drawing/2010/main" val="0"/>
+              </a:ext>
+            </a:extLst>
+          </a:blip>
+          <a:srcRect/>
+          <a:stretch>
+            <a:fillRect/>
+          </a:stretch>
+        </p:blipFill>
+        <p:spPr bwMode="auto">
+          <a:xfrm>
+            <a:off x="6418172" y="53268"/>
+            <a:ext cx="4749196" cy="3304896"/>
+          </a:xfrm>
+          <a:prstGeom prst="rect">
+            <a:avLst/>
+          </a:prstGeom>
+          <a:noFill/>
+        </p:spPr>
+      </p:pic>
+      <p:pic>
+        <p:nvPicPr>
+          <p:cNvPr id="6" name="Bildobjekt 5">
+            <a:extLst>
+              <a:ext uri="{FF2B5EF4-FFF2-40B4-BE49-F238E27FC236}">
+                <a16:creationId xmlns:a16="http://schemas.microsoft.com/office/drawing/2014/main" id="{32FC87C4-F9BC-FDF6-CCD8-DDB124B9A4C0}"/>
+              </a:ext>
+            </a:extLst>
+          </p:cNvPr>
+          <p:cNvPicPr>
+            <a:picLocks noChangeAspect="1"/>
+          </p:cNvPicPr>
+          <p:nvPr/>
+        </p:nvPicPr>
+        <p:blipFill>
+          <a:blip r:embed="rId4"/>
+          <a:stretch>
+            <a:fillRect/>
+          </a:stretch>
+        </p:blipFill>
+        <p:spPr>
+          <a:xfrm>
+            <a:off x="-176238" y="3764131"/>
+            <a:ext cx="4355060" cy="2951825"/>
+          </a:xfrm>
+          <a:prstGeom prst="rect">
+            <a:avLst/>
+          </a:prstGeom>
+        </p:spPr>
+      </p:pic>
+      <p:pic>
+        <p:nvPicPr>
+          <p:cNvPr id="7" name="Bildobjekt 6">
+            <a:extLst>
+              <a:ext uri="{FF2B5EF4-FFF2-40B4-BE49-F238E27FC236}">
+                <a16:creationId xmlns:a16="http://schemas.microsoft.com/office/drawing/2014/main" id="{27C41BF4-C504-E968-E5F9-0622277277F1}"/>
+              </a:ext>
+            </a:extLst>
+          </p:cNvPr>
+          <p:cNvPicPr>
+            <a:picLocks noChangeAspect="1"/>
+          </p:cNvPicPr>
+          <p:nvPr/>
+        </p:nvPicPr>
+        <p:blipFill>
+          <a:blip r:embed="rId5"/>
+          <a:stretch>
+            <a:fillRect/>
+          </a:stretch>
+        </p:blipFill>
+        <p:spPr>
+          <a:xfrm>
+            <a:off x="3985353" y="3764131"/>
+            <a:ext cx="4238798" cy="2951825"/>
+          </a:xfrm>
+          <a:prstGeom prst="rect">
+            <a:avLst/>
+          </a:prstGeom>
+        </p:spPr>
+      </p:pic>
+      <p:pic>
+        <p:nvPicPr>
+          <p:cNvPr id="8" name="Bildobjekt 7">
+            <a:extLst>
+              <a:ext uri="{FF2B5EF4-FFF2-40B4-BE49-F238E27FC236}">
+                <a16:creationId xmlns:a16="http://schemas.microsoft.com/office/drawing/2014/main" id="{A85BCE13-3EBD-60BB-EA39-AB17C0ECF50D}"/>
+              </a:ext>
+            </a:extLst>
+          </p:cNvPr>
+          <p:cNvPicPr>
+            <a:picLocks noChangeAspect="1"/>
+          </p:cNvPicPr>
+          <p:nvPr/>
+        </p:nvPicPr>
+        <p:blipFill>
+          <a:blip r:embed="rId6"/>
+          <a:stretch>
+            <a:fillRect/>
+          </a:stretch>
+        </p:blipFill>
+        <p:spPr>
+          <a:xfrm>
+            <a:off x="8013180" y="3764131"/>
+            <a:ext cx="4355060" cy="2955220"/>
+          </a:xfrm>
+          <a:prstGeom prst="rect">
+            <a:avLst/>
+          </a:prstGeom>
+        </p:spPr>
+      </p:pic>
+    </p:spTree>
+    <p:extLst>
+      <p:ext uri="{BB962C8B-B14F-4D97-AF65-F5344CB8AC3E}">
+        <p14:creationId xmlns:p14="http://schemas.microsoft.com/office/powerpoint/2010/main" val="876620510"/>
+      </p:ext>
+    </p:extLst>
+  </p:cSld>
+  <p:clrMapOvr>
+    <a:masterClrMapping/>
+  </p:clrMapOvr>
+</p:sld>
+</file>
+
+<file path=ppt/slides/slide32.xml><?xml version="1.0" encoding="utf-8"?>
+<p:sld xmlns:a="http://schemas.openxmlformats.org/drawingml/2006/main" xmlns:r="http://schemas.openxmlformats.org/officeDocument/2006/relationships" xmlns:p="http://schemas.openxmlformats.org/presentationml/2006/main">
+  <p:cSld>
+    <p:spTree>
+      <p:nvGrpSpPr>
+        <p:cNvPr id="1" name=""/>
+        <p:cNvGrpSpPr/>
+        <p:nvPr/>
+      </p:nvGrpSpPr>
+      <p:grpSpPr>
+        <a:xfrm>
+          <a:off x="0" y="0"/>
+          <a:ext cx="0" cy="0"/>
+          <a:chOff x="0" y="0"/>
+          <a:chExt cx="0" cy="0"/>
+        </a:xfrm>
+      </p:grpSpPr>
+      <p:sp>
+        <p:nvSpPr>
+          <p:cNvPr id="2" name="Rubrik 1">
+            <a:extLst>
+              <a:ext uri="{FF2B5EF4-FFF2-40B4-BE49-F238E27FC236}">
+                <a16:creationId xmlns:a16="http://schemas.microsoft.com/office/drawing/2014/main" id="{E2896D92-452D-89B0-F805-2E17CA6C0BA8}"/>
+              </a:ext>
+            </a:extLst>
+          </p:cNvPr>
+          <p:cNvSpPr>
+            <a:spLocks noGrp="1"/>
+          </p:cNvSpPr>
+          <p:nvPr>
+            <p:ph type="title"/>
+          </p:nvPr>
+        </p:nvSpPr>
+        <p:spPr/>
+        <p:txBody>
+          <a:bodyPr/>
+          <a:lstStyle/>
+          <a:p>
+            <a:endParaRPr lang="sv-FI"/>
+          </a:p>
+        </p:txBody>
+      </p:sp>
+      <p:sp>
+        <p:nvSpPr>
+          <p:cNvPr id="3" name="Platshållare för innehåll 2">
+            <a:extLst>
+              <a:ext uri="{FF2B5EF4-FFF2-40B4-BE49-F238E27FC236}">
+                <a16:creationId xmlns:a16="http://schemas.microsoft.com/office/drawing/2014/main" id="{B7D5C5AE-56DA-5414-6694-6323FBA1D1FC}"/>
+              </a:ext>
+            </a:extLst>
+          </p:cNvPr>
+          <p:cNvSpPr>
+            <a:spLocks noGrp="1"/>
+          </p:cNvSpPr>
+          <p:nvPr>
+            <p:ph idx="1"/>
+          </p:nvPr>
+        </p:nvSpPr>
+        <p:spPr/>
+        <p:txBody>
+          <a:bodyPr/>
+          <a:lstStyle/>
+          <a:p>
+            <a:endParaRPr lang="sv-FI"/>
+          </a:p>
+        </p:txBody>
+      </p:sp>
+      <p:pic>
+        <p:nvPicPr>
+          <p:cNvPr id="4" name="Bildobjekt 3">
+            <a:extLst>
+              <a:ext uri="{FF2B5EF4-FFF2-40B4-BE49-F238E27FC236}">
+                <a16:creationId xmlns:a16="http://schemas.microsoft.com/office/drawing/2014/main" id="{54713E8B-D096-FA39-658D-6ECF8B17F3BD}"/>
+              </a:ext>
+            </a:extLst>
+          </p:cNvPr>
+          <p:cNvPicPr>
+            <a:picLocks noChangeAspect="1"/>
+          </p:cNvPicPr>
+          <p:nvPr/>
+        </p:nvPicPr>
+        <p:blipFill>
+          <a:blip r:embed="rId2"/>
+          <a:stretch>
+            <a:fillRect/>
+          </a:stretch>
+        </p:blipFill>
+        <p:spPr>
+          <a:xfrm>
+            <a:off x="1597980" y="365125"/>
+            <a:ext cx="9498367" cy="4566522"/>
+          </a:xfrm>
+          <a:prstGeom prst="rect">
+            <a:avLst/>
+          </a:prstGeom>
+        </p:spPr>
+      </p:pic>
+    </p:spTree>
+    <p:extLst>
+      <p:ext uri="{BB962C8B-B14F-4D97-AF65-F5344CB8AC3E}">
+        <p14:creationId xmlns:p14="http://schemas.microsoft.com/office/powerpoint/2010/main" val="3955690397"/>
+      </p:ext>
+    </p:extLst>
+  </p:cSld>
+  <p:clrMapOvr>
+    <a:masterClrMapping/>
+  </p:clrMapOvr>
+</p:sld>
+</file>
+
+<file path=ppt/slides/slide33.xml><?xml version="1.0" encoding="utf-8"?>
+<p:sld xmlns:a="http://schemas.openxmlformats.org/drawingml/2006/main" xmlns:r="http://schemas.openxmlformats.org/officeDocument/2006/relationships" xmlns:p="http://schemas.openxmlformats.org/presentationml/2006/main">
+  <p:cSld>
+    <p:spTree>
+      <p:nvGrpSpPr>
+        <p:cNvPr id="1" name=""/>
+        <p:cNvGrpSpPr/>
+        <p:nvPr/>
+      </p:nvGrpSpPr>
+      <p:grpSpPr>
+        <a:xfrm>
+          <a:off x="0" y="0"/>
+          <a:ext cx="0" cy="0"/>
+          <a:chOff x="0" y="0"/>
+          <a:chExt cx="0" cy="0"/>
+        </a:xfrm>
+      </p:grpSpPr>
+      <p:sp>
+        <p:nvSpPr>
+          <p:cNvPr id="2" name="Rubrik 1">
+            <a:extLst>
+              <a:ext uri="{FF2B5EF4-FFF2-40B4-BE49-F238E27FC236}">
+                <a16:creationId xmlns:a16="http://schemas.microsoft.com/office/drawing/2014/main" id="{97EF74AE-EF2A-8D95-EB2D-20F91A9CEA23}"/>
+              </a:ext>
+            </a:extLst>
+          </p:cNvPr>
+          <p:cNvSpPr>
+            <a:spLocks noGrp="1"/>
+          </p:cNvSpPr>
+          <p:nvPr>
+            <p:ph type="title"/>
+          </p:nvPr>
+        </p:nvSpPr>
+        <p:spPr/>
+        <p:txBody>
+          <a:bodyPr/>
+          <a:lstStyle/>
+          <a:p>
+            <a:endParaRPr lang="sv-FI"/>
+          </a:p>
+        </p:txBody>
+      </p:sp>
+      <p:sp>
+        <p:nvSpPr>
+          <p:cNvPr id="3" name="Platshållare för innehåll 2">
+            <a:extLst>
+              <a:ext uri="{FF2B5EF4-FFF2-40B4-BE49-F238E27FC236}">
+                <a16:creationId xmlns:a16="http://schemas.microsoft.com/office/drawing/2014/main" id="{C7346714-696F-DB05-454E-E8D8E543FCF7}"/>
+              </a:ext>
+            </a:extLst>
+          </p:cNvPr>
+          <p:cNvSpPr>
+            <a:spLocks noGrp="1"/>
+          </p:cNvSpPr>
+          <p:nvPr>
+            <p:ph idx="1"/>
+          </p:nvPr>
+        </p:nvSpPr>
+        <p:spPr/>
+        <p:txBody>
+          <a:bodyPr/>
+          <a:lstStyle/>
+          <a:p>
+            <a:r>
+              <a:rPr lang="sv-FI" dirty="0"/>
+              <a:t>Abstract OK?</a:t>
+            </a:r>
+          </a:p>
+          <a:p>
+            <a:r>
+              <a:rPr lang="sv-FI" dirty="0" err="1"/>
+              <a:t>Title</a:t>
+            </a:r>
+            <a:r>
+              <a:rPr lang="sv-FI" dirty="0"/>
+              <a:t>?</a:t>
+            </a:r>
+          </a:p>
+          <a:p>
+            <a:endParaRPr lang="sv-FI" dirty="0"/>
+          </a:p>
+          <a:p>
+            <a:r>
+              <a:rPr lang="sv-FI" dirty="0" err="1"/>
+              <a:t>Next</a:t>
+            </a:r>
+            <a:r>
+              <a:rPr lang="sv-FI" dirty="0"/>
+              <a:t> steps?</a:t>
+            </a:r>
+          </a:p>
+          <a:p>
+            <a:r>
+              <a:rPr lang="sv-FI" dirty="0" err="1"/>
+              <a:t>What</a:t>
+            </a:r>
+            <a:r>
+              <a:rPr lang="sv-FI" dirty="0"/>
+              <a:t> to </a:t>
+            </a:r>
+            <a:r>
+              <a:rPr lang="sv-FI" dirty="0" err="1"/>
+              <a:t>add</a:t>
+            </a:r>
+            <a:r>
+              <a:rPr lang="sv-FI" dirty="0"/>
+              <a:t> to </a:t>
+            </a:r>
+            <a:r>
+              <a:rPr lang="sv-FI" dirty="0" err="1"/>
+              <a:t>analysis</a:t>
+            </a:r>
+            <a:r>
+              <a:rPr lang="sv-FI" dirty="0"/>
+              <a:t>?</a:t>
+            </a:r>
+          </a:p>
+          <a:p>
+            <a:pPr lvl="1"/>
+            <a:r>
+              <a:rPr lang="en-US" dirty="0"/>
+              <a:t>Calculate link- and </a:t>
+            </a:r>
+            <a:r>
+              <a:rPr lang="en-US" dirty="0" err="1"/>
+              <a:t>nodeweighted</a:t>
+            </a:r>
+            <a:r>
+              <a:rPr lang="en-US" dirty="0"/>
+              <a:t> metrics</a:t>
+            </a:r>
+            <a:endParaRPr lang="sv-FI" dirty="0"/>
+          </a:p>
+          <a:p>
+            <a:pPr lvl="1"/>
+            <a:r>
+              <a:rPr lang="en-US" dirty="0"/>
+              <a:t>Plot R50 against </a:t>
+            </a:r>
+            <a:r>
+              <a:rPr lang="en-US" dirty="0" err="1"/>
+              <a:t>linkweighted</a:t>
+            </a:r>
+            <a:r>
+              <a:rPr lang="en-US" dirty="0"/>
+              <a:t> </a:t>
+            </a:r>
+            <a:r>
+              <a:rPr lang="en-US" dirty="0" err="1"/>
+              <a:t>connectance</a:t>
+            </a:r>
+            <a:endParaRPr lang="sv-FI" dirty="0"/>
+          </a:p>
+          <a:p>
+            <a:pPr lvl="1"/>
+            <a:endParaRPr lang="sv-FI" dirty="0"/>
+          </a:p>
+          <a:p>
+            <a:pPr marL="0" indent="0">
+              <a:buNone/>
+            </a:pPr>
+            <a:endParaRPr lang="sv-FI" dirty="0"/>
+          </a:p>
+        </p:txBody>
+      </p:sp>
+    </p:spTree>
+    <p:extLst>
+      <p:ext uri="{BB962C8B-B14F-4D97-AF65-F5344CB8AC3E}">
+        <p14:creationId xmlns:p14="http://schemas.microsoft.com/office/powerpoint/2010/main" val="3445263117"/>
       </p:ext>
     </p:extLst>
   </p:cSld>

</xml_diff>